<commit_message>
lil change on ppt
</commit_message>
<xml_diff>
--- a/24Jan Meeting.pptx
+++ b/24Jan Meeting.pptx
@@ -9,6 +9,7 @@
     <p:sldId id="257" r:id="rId3"/>
     <p:sldId id="258" r:id="rId4"/>
     <p:sldId id="259" r:id="rId5"/>
+    <p:sldId id="260" r:id="rId6"/>
   </p:sldIdLst>
   <p:sldSz cx="12192000" cy="6858000"/>
   <p:notesSz cx="6858000" cy="9144000"/>
@@ -107,6 +108,11 @@
       </a:defRPr>
     </a:lvl9pPr>
   </p:defaultTextStyle>
+  <p:extLst>
+    <p:ext uri="{EFAFB233-063F-42B5-8137-9DF3F51BA10A}">
+      <p15:sldGuideLst xmlns:p15="http://schemas.microsoft.com/office/powerpoint/2012/main"/>
+    </p:ext>
+  </p:extLst>
 </p:presentation>
 </file>
 
@@ -115,7 +121,7 @@
   <pc:docChgLst>
     <pc:chgData name="Gervasio Ramirez" userId="618ea012289dca19" providerId="LiveId" clId="{0F8B5D32-E5D4-40B5-BEFE-EC74F9C0E01A}"/>
     <pc:docChg chg="custSel addSld modSld">
-      <pc:chgData name="Gervasio Ramirez" userId="618ea012289dca19" providerId="LiveId" clId="{0F8B5D32-E5D4-40B5-BEFE-EC74F9C0E01A}" dt="2025-01-22T14:52:12.983" v="19" actId="207"/>
+      <pc:chgData name="Gervasio Ramirez" userId="618ea012289dca19" providerId="LiveId" clId="{0F8B5D32-E5D4-40B5-BEFE-EC74F9C0E01A}" dt="2025-01-22T15:23:02.890" v="31" actId="680"/>
       <pc:docMkLst>
         <pc:docMk/>
       </pc:docMkLst>
@@ -213,7 +219,7 @@
         </pc:picChg>
       </pc:sldChg>
       <pc:sldChg chg="addSp delSp modSp new mod">
-        <pc:chgData name="Gervasio Ramirez" userId="618ea012289dca19" providerId="LiveId" clId="{0F8B5D32-E5D4-40B5-BEFE-EC74F9C0E01A}" dt="2025-01-22T14:52:12.983" v="19" actId="207"/>
+        <pc:chgData name="Gervasio Ramirez" userId="618ea012289dca19" providerId="LiveId" clId="{0F8B5D32-E5D4-40B5-BEFE-EC74F9C0E01A}" dt="2025-01-22T15:22:56.945" v="30" actId="1076"/>
         <pc:sldMkLst>
           <pc:docMk/>
           <pc:sldMk cId="2348909789" sldId="259"/>
@@ -235,13 +241,36 @@
           </ac:spMkLst>
         </pc:spChg>
         <pc:spChg chg="add mod">
-          <ac:chgData name="Gervasio Ramirez" userId="618ea012289dca19" providerId="LiveId" clId="{0F8B5D32-E5D4-40B5-BEFE-EC74F9C0E01A}" dt="2025-01-22T14:52:12.983" v="19" actId="207"/>
+          <ac:chgData name="Gervasio Ramirez" userId="618ea012289dca19" providerId="LiveId" clId="{0F8B5D32-E5D4-40B5-BEFE-EC74F9C0E01A}" dt="2025-01-22T15:22:26.198" v="20" actId="1076"/>
           <ac:spMkLst>
             <pc:docMk/>
             <pc:sldMk cId="2348909789" sldId="259"/>
             <ac:spMk id="5" creationId="{C4F89F24-76DE-C621-5994-9C88F49023C4}"/>
           </ac:spMkLst>
         </pc:spChg>
+        <pc:picChg chg="add mod">
+          <ac:chgData name="Gervasio Ramirez" userId="618ea012289dca19" providerId="LiveId" clId="{0F8B5D32-E5D4-40B5-BEFE-EC74F9C0E01A}" dt="2025-01-22T15:22:55.035" v="29" actId="1076"/>
+          <ac:picMkLst>
+            <pc:docMk/>
+            <pc:sldMk cId="2348909789" sldId="259"/>
+            <ac:picMk id="3" creationId="{535BB604-005B-B437-3396-F18282E30A94}"/>
+          </ac:picMkLst>
+        </pc:picChg>
+        <pc:picChg chg="add mod">
+          <ac:chgData name="Gervasio Ramirez" userId="618ea012289dca19" providerId="LiveId" clId="{0F8B5D32-E5D4-40B5-BEFE-EC74F9C0E01A}" dt="2025-01-22T15:22:56.945" v="30" actId="1076"/>
+          <ac:picMkLst>
+            <pc:docMk/>
+            <pc:sldMk cId="2348909789" sldId="259"/>
+            <ac:picMk id="6" creationId="{98279D0A-44C3-496C-3BCF-297D08C8F0C6}"/>
+          </ac:picMkLst>
+        </pc:picChg>
+      </pc:sldChg>
+      <pc:sldChg chg="new">
+        <pc:chgData name="Gervasio Ramirez" userId="618ea012289dca19" providerId="LiveId" clId="{0F8B5D32-E5D4-40B5-BEFE-EC74F9C0E01A}" dt="2025-01-22T15:23:02.890" v="31" actId="680"/>
+        <pc:sldMkLst>
+          <pc:docMk/>
+          <pc:sldMk cId="1601390383" sldId="260"/>
+        </pc:sldMkLst>
       </pc:sldChg>
     </pc:docChg>
   </pc:docChgLst>
@@ -3656,7 +3685,7 @@
         </p:nvSpPr>
         <p:spPr>
           <a:xfrm>
-            <a:off x="3048000" y="2828836"/>
+            <a:off x="1003379" y="2277924"/>
             <a:ext cx="6096000" cy="1200329"/>
           </a:xfrm>
           <a:prstGeom prst="rect">
@@ -3737,10 +3766,150 @@
           </a:p>
         </p:txBody>
       </p:sp>
+      <p:pic>
+        <p:nvPicPr>
+          <p:cNvPr id="3" name="Picture 2">
+            <a:extLst>
+              <a:ext uri="{FF2B5EF4-FFF2-40B4-BE49-F238E27FC236}">
+                <a16:creationId xmlns:a16="http://schemas.microsoft.com/office/drawing/2014/main" id="{535BB604-005B-B437-3396-F18282E30A94}"/>
+              </a:ext>
+            </a:extLst>
+          </p:cNvPr>
+          <p:cNvPicPr>
+            <a:picLocks noChangeAspect="1"/>
+          </p:cNvPicPr>
+          <p:nvPr/>
+        </p:nvPicPr>
+        <p:blipFill>
+          <a:blip r:embed="rId2"/>
+          <a:stretch>
+            <a:fillRect/>
+          </a:stretch>
+        </p:blipFill>
+        <p:spPr>
+          <a:xfrm>
+            <a:off x="6800739" y="175964"/>
+            <a:ext cx="5290501" cy="6305413"/>
+          </a:xfrm>
+          <a:prstGeom prst="rect">
+            <a:avLst/>
+          </a:prstGeom>
+        </p:spPr>
+      </p:pic>
+      <p:pic>
+        <p:nvPicPr>
+          <p:cNvPr id="6" name="Picture 5">
+            <a:extLst>
+              <a:ext uri="{FF2B5EF4-FFF2-40B4-BE49-F238E27FC236}">
+                <a16:creationId xmlns:a16="http://schemas.microsoft.com/office/drawing/2014/main" id="{98279D0A-44C3-496C-3BCF-297D08C8F0C6}"/>
+              </a:ext>
+            </a:extLst>
+          </p:cNvPr>
+          <p:cNvPicPr>
+            <a:picLocks noChangeAspect="1"/>
+          </p:cNvPicPr>
+          <p:nvPr/>
+        </p:nvPicPr>
+        <p:blipFill>
+          <a:blip r:embed="rId3"/>
+          <a:stretch>
+            <a:fillRect/>
+          </a:stretch>
+        </p:blipFill>
+        <p:spPr>
+          <a:xfrm>
+            <a:off x="618371" y="4406203"/>
+            <a:ext cx="5198687" cy="2009390"/>
+          </a:xfrm>
+          <a:prstGeom prst="rect">
+            <a:avLst/>
+          </a:prstGeom>
+        </p:spPr>
+      </p:pic>
     </p:spTree>
     <p:extLst>
       <p:ext uri="{BB962C8B-B14F-4D97-AF65-F5344CB8AC3E}">
         <p14:creationId xmlns:p14="http://schemas.microsoft.com/office/powerpoint/2010/main" val="2348909789"/>
+      </p:ext>
+    </p:extLst>
+  </p:cSld>
+  <p:clrMapOvr>
+    <a:masterClrMapping/>
+  </p:clrMapOvr>
+</p:sld>
+</file>
+
+<file path=ppt/slides/slide5.xml><?xml version="1.0" encoding="utf-8"?>
+<p:sld xmlns:a="http://schemas.openxmlformats.org/drawingml/2006/main" xmlns:r="http://schemas.openxmlformats.org/officeDocument/2006/relationships" xmlns:p="http://schemas.openxmlformats.org/presentationml/2006/main">
+  <p:cSld>
+    <p:spTree>
+      <p:nvGrpSpPr>
+        <p:cNvPr id="1" name=""/>
+        <p:cNvGrpSpPr/>
+        <p:nvPr/>
+      </p:nvGrpSpPr>
+      <p:grpSpPr>
+        <a:xfrm>
+          <a:off x="0" y="0"/>
+          <a:ext cx="0" cy="0"/>
+          <a:chOff x="0" y="0"/>
+          <a:chExt cx="0" cy="0"/>
+        </a:xfrm>
+      </p:grpSpPr>
+      <p:sp>
+        <p:nvSpPr>
+          <p:cNvPr id="2" name="Title 1">
+            <a:extLst>
+              <a:ext uri="{FF2B5EF4-FFF2-40B4-BE49-F238E27FC236}">
+                <a16:creationId xmlns:a16="http://schemas.microsoft.com/office/drawing/2014/main" id="{C3778B39-F036-C6CF-EC07-121D49E9C62C}"/>
+              </a:ext>
+            </a:extLst>
+          </p:cNvPr>
+          <p:cNvSpPr>
+            <a:spLocks noGrp="1"/>
+          </p:cNvSpPr>
+          <p:nvPr>
+            <p:ph type="title"/>
+          </p:nvPr>
+        </p:nvSpPr>
+        <p:spPr/>
+        <p:txBody>
+          <a:bodyPr/>
+          <a:lstStyle/>
+          <a:p>
+            <a:endParaRPr lang="en-GB"/>
+          </a:p>
+        </p:txBody>
+      </p:sp>
+      <p:sp>
+        <p:nvSpPr>
+          <p:cNvPr id="3" name="Content Placeholder 2">
+            <a:extLst>
+              <a:ext uri="{FF2B5EF4-FFF2-40B4-BE49-F238E27FC236}">
+                <a16:creationId xmlns:a16="http://schemas.microsoft.com/office/drawing/2014/main" id="{2B0677BB-4FE1-83B4-CA09-E95944C08043}"/>
+              </a:ext>
+            </a:extLst>
+          </p:cNvPr>
+          <p:cNvSpPr>
+            <a:spLocks noGrp="1"/>
+          </p:cNvSpPr>
+          <p:nvPr>
+            <p:ph idx="1"/>
+          </p:nvPr>
+        </p:nvSpPr>
+        <p:spPr/>
+        <p:txBody>
+          <a:bodyPr/>
+          <a:lstStyle/>
+          <a:p>
+            <a:endParaRPr lang="en-GB"/>
+          </a:p>
+        </p:txBody>
+      </p:sp>
+    </p:spTree>
+    <p:extLst>
+      <p:ext uri="{BB962C8B-B14F-4D97-AF65-F5344CB8AC3E}">
+        <p14:creationId xmlns:p14="http://schemas.microsoft.com/office/powerpoint/2010/main" val="1601390383"/>
       </p:ext>
     </p:extLst>
   </p:cSld>

</xml_diff>